<commit_message>
added suggested changes in slide notes
</commit_message>
<xml_diff>
--- a/doc/slides/day4/session2/DataSharing.pptx
+++ b/doc/slides/day4/session2/DataSharing.pptx
@@ -602,6 +602,223 @@
         </p:txBody>
       </p:sp>
     </p:spTree>
+  </p:cSld>
+  <p:clrMapOvr>
+    <a:masterClrMapping/>
+  </p:clrMapOvr>
+</p:notes>
+</file>
+
+<file path=ppt/notesSlides/notesSlide2.xml><?xml version="1.0" encoding="utf-8"?>
+<p:notes xmlns:a="http://schemas.openxmlformats.org/drawingml/2006/main" xmlns:r="http://schemas.openxmlformats.org/officeDocument/2006/relationships" xmlns:p="http://schemas.openxmlformats.org/presentationml/2006/main">
+  <p:cSld>
+    <p:spTree>
+      <p:nvGrpSpPr>
+        <p:cNvPr id="1" name=""/>
+        <p:cNvGrpSpPr/>
+        <p:nvPr/>
+      </p:nvGrpSpPr>
+      <p:grpSpPr>
+        <a:xfrm>
+          <a:off x="0" y="0"/>
+          <a:ext cx="0" cy="0"/>
+          <a:chOff x="0" y="0"/>
+          <a:chExt cx="0" cy="0"/>
+        </a:xfrm>
+      </p:grpSpPr>
+      <p:sp>
+        <p:nvSpPr>
+          <p:cNvPr id="2" name="Tijdelijke aanduiding voor dia-afbeelding 1"/>
+          <p:cNvSpPr>
+            <a:spLocks noGrp="1" noRot="1" noChangeAspect="1"/>
+          </p:cNvSpPr>
+          <p:nvPr>
+            <p:ph type="sldImg"/>
+          </p:nvPr>
+        </p:nvSpPr>
+        <p:spPr/>
+      </p:sp>
+      <p:sp>
+        <p:nvSpPr>
+          <p:cNvPr id="3" name="Tijdelijke aanduiding voor notities 2"/>
+          <p:cNvSpPr>
+            <a:spLocks noGrp="1"/>
+          </p:cNvSpPr>
+          <p:nvPr>
+            <p:ph type="body" idx="1"/>
+          </p:nvPr>
+        </p:nvSpPr>
+        <p:spPr/>
+        <p:txBody>
+          <a:bodyPr/>
+          <a:lstStyle/>
+          <a:p>
+            <a:r>
+              <a:rPr lang="nl-NL" dirty="0" err="1" smtClean="0"/>
+              <a:t>Here</a:t>
+            </a:r>
+            <a:r>
+              <a:rPr lang="nl-NL" dirty="0" smtClean="0"/>
+              <a:t> do: upload data </a:t>
+            </a:r>
+            <a:r>
+              <a:rPr lang="nl-NL" dirty="0" err="1" smtClean="0"/>
+              <a:t>to</a:t>
+            </a:r>
+            <a:r>
+              <a:rPr lang="nl-NL" dirty="0" smtClean="0"/>
+              <a:t> </a:t>
+            </a:r>
+            <a:r>
+              <a:rPr lang="nl-NL" dirty="0" err="1" smtClean="0"/>
+              <a:t>your</a:t>
+            </a:r>
+            <a:r>
+              <a:rPr lang="nl-NL" dirty="0" smtClean="0"/>
+              <a:t> </a:t>
+            </a:r>
+            <a:r>
+              <a:rPr lang="nl-NL" dirty="0" err="1" smtClean="0"/>
+              <a:t>local</a:t>
+            </a:r>
+            <a:r>
+              <a:rPr lang="nl-NL" baseline="0" dirty="0" smtClean="0"/>
+              <a:t> </a:t>
+            </a:r>
+            <a:r>
+              <a:rPr lang="nl-NL" baseline="0" dirty="0" err="1" smtClean="0"/>
+              <a:t>galaxy</a:t>
+            </a:r>
+            <a:r>
+              <a:rPr lang="nl-NL" baseline="0" dirty="0" smtClean="0"/>
+              <a:t> </a:t>
+            </a:r>
+            <a:r>
+              <a:rPr lang="nl-NL" baseline="0" dirty="0" err="1" smtClean="0"/>
+              <a:t>instance</a:t>
+            </a:r>
+            <a:r>
+              <a:rPr lang="nl-NL" baseline="0" dirty="0" smtClean="0"/>
+              <a:t>, </a:t>
+            </a:r>
+            <a:r>
+              <a:rPr lang="nl-NL" baseline="0" dirty="0" err="1" smtClean="0"/>
+              <a:t>which</a:t>
+            </a:r>
+            <a:r>
+              <a:rPr lang="nl-NL" baseline="0" dirty="0" smtClean="0"/>
+              <a:t> means </a:t>
+            </a:r>
+            <a:r>
+              <a:rPr lang="nl-NL" baseline="0" dirty="0" err="1" smtClean="0"/>
+              <a:t>configuring</a:t>
+            </a:r>
+            <a:r>
+              <a:rPr lang="nl-NL" baseline="0" dirty="0" smtClean="0"/>
+              <a:t> </a:t>
+            </a:r>
+            <a:r>
+              <a:rPr lang="nl-NL" baseline="0" dirty="0" err="1" smtClean="0"/>
+              <a:t>universe_wsg.ini</a:t>
+            </a:r>
+            <a:r>
+              <a:rPr lang="nl-NL" baseline="0" dirty="0" smtClean="0"/>
+              <a:t> </a:t>
+            </a:r>
+            <a:r>
+              <a:rPr lang="nl-NL" baseline="0" dirty="0" err="1" smtClean="0"/>
+              <a:t>to</a:t>
+            </a:r>
+            <a:r>
+              <a:rPr lang="nl-NL" baseline="0" dirty="0" smtClean="0"/>
+              <a:t>:</a:t>
+            </a:r>
+          </a:p>
+          <a:p>
+            <a:pPr marL="228600" indent="-228600">
+              <a:buAutoNum type="arabicPeriod"/>
+            </a:pPr>
+            <a:r>
+              <a:rPr lang="nl-NL" baseline="0" dirty="0" smtClean="0"/>
+              <a:t>make </a:t>
+            </a:r>
+            <a:r>
+              <a:rPr lang="nl-NL" baseline="0" dirty="0" err="1" smtClean="0"/>
+              <a:t>yourself</a:t>
+            </a:r>
+            <a:r>
+              <a:rPr lang="nl-NL" baseline="0" dirty="0" smtClean="0"/>
+              <a:t> </a:t>
+            </a:r>
+            <a:r>
+              <a:rPr lang="nl-NL" baseline="0" dirty="0" err="1" smtClean="0"/>
+              <a:t>admin</a:t>
+            </a:r>
+            <a:endParaRPr lang="nl-NL" baseline="0" dirty="0" smtClean="0"/>
+          </a:p>
+          <a:p>
+            <a:pPr marL="228600" indent="-228600">
+              <a:buAutoNum type="arabicPeriod"/>
+            </a:pPr>
+            <a:r>
+              <a:rPr lang="nl-NL" dirty="0" smtClean="0"/>
+              <a:t>look in a data folder</a:t>
+            </a:r>
+          </a:p>
+          <a:p>
+            <a:pPr marL="228600" indent="-228600">
+              <a:buAutoNum type="arabicPeriod"/>
+            </a:pPr>
+            <a:r>
+              <a:rPr lang="nl-NL" dirty="0" smtClean="0"/>
+              <a:t>import the contents of </a:t>
+            </a:r>
+            <a:r>
+              <a:rPr lang="nl-NL" dirty="0" err="1" smtClean="0"/>
+              <a:t>that</a:t>
+            </a:r>
+            <a:r>
+              <a:rPr lang="nl-NL" dirty="0" smtClean="0"/>
+              <a:t> folder in a data </a:t>
+            </a:r>
+            <a:r>
+              <a:rPr lang="nl-NL" smtClean="0"/>
+              <a:t>library</a:t>
+            </a:r>
+            <a:endParaRPr lang="nl-NL"/>
+          </a:p>
+        </p:txBody>
+      </p:sp>
+      <p:sp>
+        <p:nvSpPr>
+          <p:cNvPr id="4" name="Tijdelijke aanduiding voor dianummer 3"/>
+          <p:cNvSpPr>
+            <a:spLocks noGrp="1"/>
+          </p:cNvSpPr>
+          <p:nvPr>
+            <p:ph type="sldNum" sz="quarter" idx="10"/>
+          </p:nvPr>
+        </p:nvSpPr>
+        <p:spPr/>
+        <p:txBody>
+          <a:bodyPr/>
+          <a:lstStyle/>
+          <a:p>
+            <a:fld id="{19B8BEE1-0E6E-5E4B-96E2-81C98D2E9300}" type="slidenum">
+              <a:rPr lang="en-US" smtClean="0"/>
+              <a:pPr/>
+              <a:t>16</a:t>
+            </a:fld>
+            <a:endParaRPr lang="en-US"/>
+          </a:p>
+        </p:txBody>
+      </p:sp>
+    </p:spTree>
+    <p:extLst>
+      <p:ext uri="{BB962C8B-B14F-4D97-AF65-F5344CB8AC3E}">
+        <p14:creationId xmlns:p14="http://schemas.microsoft.com/office/powerpoint/2010/main" val="224768494"/>
+      </p:ext>
+    </p:extLst>
   </p:cSld>
   <p:clrMapOvr>
     <a:masterClrMapping/>

</xml_diff>